<commit_message>
feat: aba operacional - monitoramento concluída
</commit_message>
<xml_diff>
--- a/dashboards/Mockup dashboard (em construção).pptx
+++ b/dashboards/Mockup dashboard (em construção).pptx
@@ -260,7 +260,7 @@
           <a:p>
             <a:fld id="{2DB56B22-234B-48A0-9B90-72A4AF419D03}" type="datetimeFigureOut">
               <a:rPr lang="pt-BR" smtClean="0"/>
-              <a:t>25/01/2026</a:t>
+              <a:t>16/02/2026</a:t>
             </a:fld>
             <a:endParaRPr lang="pt-BR"/>
           </a:p>
@@ -458,7 +458,7 @@
           <a:p>
             <a:fld id="{2DB56B22-234B-48A0-9B90-72A4AF419D03}" type="datetimeFigureOut">
               <a:rPr lang="pt-BR" smtClean="0"/>
-              <a:t>25/01/2026</a:t>
+              <a:t>16/02/2026</a:t>
             </a:fld>
             <a:endParaRPr lang="pt-BR"/>
           </a:p>
@@ -666,7 +666,7 @@
           <a:p>
             <a:fld id="{2DB56B22-234B-48A0-9B90-72A4AF419D03}" type="datetimeFigureOut">
               <a:rPr lang="pt-BR" smtClean="0"/>
-              <a:t>25/01/2026</a:t>
+              <a:t>16/02/2026</a:t>
             </a:fld>
             <a:endParaRPr lang="pt-BR"/>
           </a:p>
@@ -864,7 +864,7 @@
           <a:p>
             <a:fld id="{2DB56B22-234B-48A0-9B90-72A4AF419D03}" type="datetimeFigureOut">
               <a:rPr lang="pt-BR" smtClean="0"/>
-              <a:t>25/01/2026</a:t>
+              <a:t>16/02/2026</a:t>
             </a:fld>
             <a:endParaRPr lang="pt-BR"/>
           </a:p>
@@ -1139,7 +1139,7 @@
           <a:p>
             <a:fld id="{2DB56B22-234B-48A0-9B90-72A4AF419D03}" type="datetimeFigureOut">
               <a:rPr lang="pt-BR" smtClean="0"/>
-              <a:t>25/01/2026</a:t>
+              <a:t>16/02/2026</a:t>
             </a:fld>
             <a:endParaRPr lang="pt-BR"/>
           </a:p>
@@ -1404,7 +1404,7 @@
           <a:p>
             <a:fld id="{2DB56B22-234B-48A0-9B90-72A4AF419D03}" type="datetimeFigureOut">
               <a:rPr lang="pt-BR" smtClean="0"/>
-              <a:t>25/01/2026</a:t>
+              <a:t>16/02/2026</a:t>
             </a:fld>
             <a:endParaRPr lang="pt-BR"/>
           </a:p>
@@ -1816,7 +1816,7 @@
           <a:p>
             <a:fld id="{2DB56B22-234B-48A0-9B90-72A4AF419D03}" type="datetimeFigureOut">
               <a:rPr lang="pt-BR" smtClean="0"/>
-              <a:t>25/01/2026</a:t>
+              <a:t>16/02/2026</a:t>
             </a:fld>
             <a:endParaRPr lang="pt-BR"/>
           </a:p>
@@ -1957,7 +1957,7 @@
           <a:p>
             <a:fld id="{2DB56B22-234B-48A0-9B90-72A4AF419D03}" type="datetimeFigureOut">
               <a:rPr lang="pt-BR" smtClean="0"/>
-              <a:t>25/01/2026</a:t>
+              <a:t>16/02/2026</a:t>
             </a:fld>
             <a:endParaRPr lang="pt-BR"/>
           </a:p>
@@ -2070,7 +2070,7 @@
           <a:p>
             <a:fld id="{2DB56B22-234B-48A0-9B90-72A4AF419D03}" type="datetimeFigureOut">
               <a:rPr lang="pt-BR" smtClean="0"/>
-              <a:t>25/01/2026</a:t>
+              <a:t>16/02/2026</a:t>
             </a:fld>
             <a:endParaRPr lang="pt-BR"/>
           </a:p>
@@ -2381,7 +2381,7 @@
           <a:p>
             <a:fld id="{2DB56B22-234B-48A0-9B90-72A4AF419D03}" type="datetimeFigureOut">
               <a:rPr lang="pt-BR" smtClean="0"/>
-              <a:t>25/01/2026</a:t>
+              <a:t>16/02/2026</a:t>
             </a:fld>
             <a:endParaRPr lang="pt-BR"/>
           </a:p>
@@ -2669,7 +2669,7 @@
           <a:p>
             <a:fld id="{2DB56B22-234B-48A0-9B90-72A4AF419D03}" type="datetimeFigureOut">
               <a:rPr lang="pt-BR" smtClean="0"/>
-              <a:t>25/01/2026</a:t>
+              <a:t>16/02/2026</a:t>
             </a:fld>
             <a:endParaRPr lang="pt-BR"/>
           </a:p>
@@ -2910,7 +2910,7 @@
           <a:p>
             <a:fld id="{2DB56B22-234B-48A0-9B90-72A4AF419D03}" type="datetimeFigureOut">
               <a:rPr lang="pt-BR" smtClean="0"/>
-              <a:t>25/01/2026</a:t>
+              <a:t>16/02/2026</a:t>
             </a:fld>
             <a:endParaRPr lang="pt-BR"/>
           </a:p>
@@ -3403,7 +3403,7 @@
         <p:spPr>
           <a:xfrm>
             <a:off x="-177079" y="897622"/>
-            <a:ext cx="805343" cy="4337108"/>
+            <a:ext cx="715733" cy="4337108"/>
           </a:xfrm>
           <a:prstGeom prst="roundRect">
             <a:avLst/>
@@ -3461,8 +3461,8 @@
         </p:nvSpPr>
         <p:spPr>
           <a:xfrm>
-            <a:off x="91290" y="2026039"/>
-            <a:ext cx="453551" cy="421885"/>
+            <a:off x="91291" y="2096342"/>
+            <a:ext cx="348481" cy="351582"/>
           </a:xfrm>
           <a:prstGeom prst="roundRect">
             <a:avLst/>
@@ -4899,8 +4899,8 @@
         </p:blipFill>
         <p:spPr>
           <a:xfrm>
-            <a:off x="109538" y="2826280"/>
-            <a:ext cx="400935" cy="400935"/>
+            <a:off x="88190" y="2818496"/>
+            <a:ext cx="351582" cy="351582"/>
           </a:xfrm>
           <a:prstGeom prst="rect">
             <a:avLst/>
@@ -4935,8 +4935,8 @@
         </p:blipFill>
         <p:spPr>
           <a:xfrm>
-            <a:off x="88189" y="3515829"/>
-            <a:ext cx="483326" cy="483326"/>
+            <a:off x="88190" y="3647572"/>
+            <a:ext cx="351582" cy="351582"/>
           </a:xfrm>
           <a:prstGeom prst="rect">
             <a:avLst/>
@@ -4971,8 +4971,8 @@
         </p:blipFill>
         <p:spPr>
           <a:xfrm>
-            <a:off x="153006" y="2076078"/>
-            <a:ext cx="334566" cy="334566"/>
+            <a:off x="108808" y="2135685"/>
+            <a:ext cx="296136" cy="296136"/>
           </a:xfrm>
           <a:prstGeom prst="rect">
             <a:avLst/>
@@ -5007,8 +5007,8 @@
         </p:blipFill>
         <p:spPr>
           <a:xfrm>
-            <a:off x="88189" y="4198812"/>
-            <a:ext cx="456652" cy="456652"/>
+            <a:off x="88190" y="4303881"/>
+            <a:ext cx="351582" cy="351582"/>
           </a:xfrm>
           <a:prstGeom prst="rect">
             <a:avLst/>
@@ -5043,8 +5043,8 @@
         </p:blipFill>
         <p:spPr>
           <a:xfrm flipH="1">
-            <a:off x="138151" y="1346299"/>
-            <a:ext cx="349421" cy="349421"/>
+            <a:off x="106392" y="1383777"/>
+            <a:ext cx="316754" cy="316754"/>
           </a:xfrm>
           <a:prstGeom prst="rect">
             <a:avLst/>
@@ -5157,7 +5157,7 @@
         <p:spPr>
           <a:xfrm>
             <a:off x="-177079" y="897622"/>
-            <a:ext cx="805343" cy="4337108"/>
+            <a:ext cx="702349" cy="4337108"/>
           </a:xfrm>
           <a:prstGeom prst="roundRect">
             <a:avLst/>
@@ -5215,8 +5215,8 @@
         </p:nvSpPr>
         <p:spPr>
           <a:xfrm>
-            <a:off x="94520" y="2685087"/>
-            <a:ext cx="450321" cy="481625"/>
+            <a:off x="84996" y="2759869"/>
+            <a:ext cx="376967" cy="406843"/>
           </a:xfrm>
           <a:prstGeom prst="roundRect">
             <a:avLst/>
@@ -5854,10 +5854,10 @@
       </p:sp>
       <p:pic>
         <p:nvPicPr>
-          <p:cNvPr id="16" name="Imagem 15" descr="Logotipo, Ícone&#10;&#10;O conteúdo gerado por IA pode estar incorreto.">
-            <a:extLst>
-              <a:ext uri="{FF2B5EF4-FFF2-40B4-BE49-F238E27FC236}">
-                <a16:creationId xmlns:a16="http://schemas.microsoft.com/office/drawing/2014/main" id="{72750EFD-5EB9-84F7-327A-F804A22CDF68}"/>
+          <p:cNvPr id="3" name="Imagem 2" descr="Ícone&#10;&#10;O conteúdo gerado por IA pode estar incorreto.">
+            <a:extLst>
+              <a:ext uri="{FF2B5EF4-FFF2-40B4-BE49-F238E27FC236}">
+                <a16:creationId xmlns:a16="http://schemas.microsoft.com/office/drawing/2014/main" id="{5DDFF6DC-D44A-A46D-56F0-9D3568F865B5}"/>
               </a:ext>
             </a:extLst>
           </p:cNvPr>
@@ -5880,8 +5880,8 @@
         </p:blipFill>
         <p:spPr>
           <a:xfrm>
-            <a:off x="88189" y="3465029"/>
-            <a:ext cx="483326" cy="483326"/>
+            <a:off x="89891" y="2011480"/>
+            <a:ext cx="349882" cy="349882"/>
           </a:xfrm>
           <a:prstGeom prst="rect">
             <a:avLst/>
@@ -5890,10 +5890,10 @@
       </p:pic>
       <p:pic>
         <p:nvPicPr>
-          <p:cNvPr id="22" name="Imagem 21" descr="Ícone&#10;&#10;O conteúdo gerado por IA pode estar incorreto.">
-            <a:extLst>
-              <a:ext uri="{FF2B5EF4-FFF2-40B4-BE49-F238E27FC236}">
-                <a16:creationId xmlns:a16="http://schemas.microsoft.com/office/drawing/2014/main" id="{80050991-3381-8A02-8110-9D095FC4F3C1}"/>
+          <p:cNvPr id="15" name="Imagem 14" descr="Ícone&#10;&#10;O conteúdo gerado por IA pode estar incorreto.">
+            <a:extLst>
+              <a:ext uri="{FF2B5EF4-FFF2-40B4-BE49-F238E27FC236}">
+                <a16:creationId xmlns:a16="http://schemas.microsoft.com/office/drawing/2014/main" id="{6DD0D9C7-92A9-3243-FC0E-365F9ACCC73C}"/>
               </a:ext>
             </a:extLst>
           </p:cNvPr>
@@ -5916,116 +5916,8 @@
         </p:blipFill>
         <p:spPr>
           <a:xfrm>
-            <a:off x="88189" y="4211512"/>
-            <a:ext cx="456652" cy="456652"/>
-          </a:xfrm>
-          <a:prstGeom prst="rect">
-            <a:avLst/>
-          </a:prstGeom>
-        </p:spPr>
-      </p:pic>
-      <p:pic>
-        <p:nvPicPr>
-          <p:cNvPr id="25" name="Imagem 24" descr="Uma imagem contendo Ícone&#10;&#10;O conteúdo gerado por IA pode estar incorreto.">
-            <a:extLst>
-              <a:ext uri="{FF2B5EF4-FFF2-40B4-BE49-F238E27FC236}">
-                <a16:creationId xmlns:a16="http://schemas.microsoft.com/office/drawing/2014/main" id="{09D0A347-19B1-96AE-D96A-6F3E5EBE9360}"/>
-              </a:ext>
-            </a:extLst>
-          </p:cNvPr>
-          <p:cNvPicPr>
-            <a:picLocks noChangeAspect="1"/>
-          </p:cNvPicPr>
-          <p:nvPr/>
-        </p:nvPicPr>
-        <p:blipFill>
-          <a:blip r:embed="rId4">
-            <a:extLst>
-              <a:ext uri="{28A0092B-C50C-407E-A947-70E740481C1C}">
-                <a14:useLocalDpi xmlns:a14="http://schemas.microsoft.com/office/drawing/2010/main" val="0"/>
-              </a:ext>
-            </a:extLst>
-          </a:blip>
-          <a:stretch>
-            <a:fillRect/>
-          </a:stretch>
-        </p:blipFill>
-        <p:spPr>
-          <a:xfrm flipH="1">
-            <a:off x="138151" y="1295499"/>
-            <a:ext cx="349421" cy="349421"/>
-          </a:xfrm>
-          <a:prstGeom prst="rect">
-            <a:avLst/>
-          </a:prstGeom>
-        </p:spPr>
-      </p:pic>
-      <p:pic>
-        <p:nvPicPr>
-          <p:cNvPr id="3" name="Imagem 2" descr="Ícone&#10;&#10;O conteúdo gerado por IA pode estar incorreto.">
-            <a:extLst>
-              <a:ext uri="{FF2B5EF4-FFF2-40B4-BE49-F238E27FC236}">
-                <a16:creationId xmlns:a16="http://schemas.microsoft.com/office/drawing/2014/main" id="{5DDFF6DC-D44A-A46D-56F0-9D3568F865B5}"/>
-              </a:ext>
-            </a:extLst>
-          </p:cNvPr>
-          <p:cNvPicPr>
-            <a:picLocks noChangeAspect="1"/>
-          </p:cNvPicPr>
-          <p:nvPr/>
-        </p:nvPicPr>
-        <p:blipFill>
-          <a:blip r:embed="rId5">
-            <a:extLst>
-              <a:ext uri="{28A0092B-C50C-407E-A947-70E740481C1C}">
-                <a14:useLocalDpi xmlns:a14="http://schemas.microsoft.com/office/drawing/2010/main" val="0"/>
-              </a:ext>
-            </a:extLst>
-          </a:blip>
-          <a:stretch>
-            <a:fillRect/>
-          </a:stretch>
-        </p:blipFill>
-        <p:spPr>
-          <a:xfrm>
-            <a:off x="89890" y="1911041"/>
-            <a:ext cx="450321" cy="450321"/>
-          </a:xfrm>
-          <a:prstGeom prst="rect">
-            <a:avLst/>
-          </a:prstGeom>
-        </p:spPr>
-      </p:pic>
-      <p:pic>
-        <p:nvPicPr>
-          <p:cNvPr id="15" name="Imagem 14" descr="Ícone&#10;&#10;O conteúdo gerado por IA pode estar incorreto.">
-            <a:extLst>
-              <a:ext uri="{FF2B5EF4-FFF2-40B4-BE49-F238E27FC236}">
-                <a16:creationId xmlns:a16="http://schemas.microsoft.com/office/drawing/2014/main" id="{6DD0D9C7-92A9-3243-FC0E-365F9ACCC73C}"/>
-              </a:ext>
-            </a:extLst>
-          </p:cNvPr>
-          <p:cNvPicPr>
-            <a:picLocks noChangeAspect="1"/>
-          </p:cNvPicPr>
-          <p:nvPr/>
-        </p:nvPicPr>
-        <p:blipFill>
-          <a:blip r:embed="rId6">
-            <a:extLst>
-              <a:ext uri="{28A0092B-C50C-407E-A947-70E740481C1C}">
-                <a14:useLocalDpi xmlns:a14="http://schemas.microsoft.com/office/drawing/2010/main" val="0"/>
-              </a:ext>
-            </a:extLst>
-          </a:blip>
-          <a:stretch>
-            <a:fillRect/>
-          </a:stretch>
-        </p:blipFill>
-        <p:spPr>
-          <a:xfrm>
-            <a:off x="144153" y="2743126"/>
-            <a:ext cx="355674" cy="355674"/>
+            <a:off x="134628" y="2819806"/>
+            <a:ext cx="278993" cy="278993"/>
           </a:xfrm>
           <a:prstGeom prst="rect">
             <a:avLst/>
@@ -6169,7 +6061,7 @@
           <p:nvPr/>
         </p:nvPicPr>
         <p:blipFill>
-          <a:blip r:embed="rId7">
+          <a:blip r:embed="rId4">
             <a:extLst>
               <a:ext uri="{28A0092B-C50C-407E-A947-70E740481C1C}">
                 <a14:useLocalDpi xmlns:a14="http://schemas.microsoft.com/office/drawing/2010/main" val="0"/>
@@ -6205,7 +6097,7 @@
           <p:nvPr/>
         </p:nvPicPr>
         <p:blipFill>
-          <a:blip r:embed="rId8">
+          <a:blip r:embed="rId5">
             <a:extLst>
               <a:ext uri="{28A0092B-C50C-407E-A947-70E740481C1C}">
                 <a14:useLocalDpi xmlns:a14="http://schemas.microsoft.com/office/drawing/2010/main" val="0"/>
@@ -6241,7 +6133,7 @@
           <p:nvPr/>
         </p:nvPicPr>
         <p:blipFill>
-          <a:blip r:embed="rId9">
+          <a:blip r:embed="rId6">
             <a:extLst>
               <a:ext uri="{28A0092B-C50C-407E-A947-70E740481C1C}">
                 <a14:useLocalDpi xmlns:a14="http://schemas.microsoft.com/office/drawing/2010/main" val="0"/>
@@ -6277,7 +6169,7 @@
           <p:nvPr/>
         </p:nvPicPr>
         <p:blipFill>
-          <a:blip r:embed="rId10">
+          <a:blip r:embed="rId7">
             <a:extLst>
               <a:ext uri="{28A0092B-C50C-407E-A947-70E740481C1C}">
                 <a14:useLocalDpi xmlns:a14="http://schemas.microsoft.com/office/drawing/2010/main" val="0"/>
@@ -6727,7 +6619,7 @@
           <p:nvPr/>
         </p:nvPicPr>
         <p:blipFill>
-          <a:blip r:embed="rId11">
+          <a:blip r:embed="rId8">
             <a:extLst>
               <a:ext uri="{28A0092B-C50C-407E-A947-70E740481C1C}">
                 <a14:useLocalDpi xmlns:a14="http://schemas.microsoft.com/office/drawing/2010/main" val="0"/>
@@ -6805,6 +6697,114 @@
           </a:p>
         </p:txBody>
       </p:sp>
+      <p:pic>
+        <p:nvPicPr>
+          <p:cNvPr id="12" name="Imagem 11" descr="Logotipo, Ícone&#10;&#10;O conteúdo gerado por IA pode estar incorreto.">
+            <a:extLst>
+              <a:ext uri="{FF2B5EF4-FFF2-40B4-BE49-F238E27FC236}">
+                <a16:creationId xmlns:a16="http://schemas.microsoft.com/office/drawing/2014/main" id="{BB80548D-950E-8D51-68FE-BE6B82C2B13C}"/>
+              </a:ext>
+            </a:extLst>
+          </p:cNvPr>
+          <p:cNvPicPr>
+            <a:picLocks noChangeAspect="1"/>
+          </p:cNvPicPr>
+          <p:nvPr/>
+        </p:nvPicPr>
+        <p:blipFill>
+          <a:blip r:embed="rId9">
+            <a:extLst>
+              <a:ext uri="{28A0092B-C50C-407E-A947-70E740481C1C}">
+                <a14:useLocalDpi xmlns:a14="http://schemas.microsoft.com/office/drawing/2010/main" val="0"/>
+              </a:ext>
+            </a:extLst>
+          </a:blip>
+          <a:stretch>
+            <a:fillRect/>
+          </a:stretch>
+        </p:blipFill>
+        <p:spPr>
+          <a:xfrm>
+            <a:off x="103430" y="3639952"/>
+            <a:ext cx="351582" cy="351582"/>
+          </a:xfrm>
+          <a:prstGeom prst="rect">
+            <a:avLst/>
+          </a:prstGeom>
+        </p:spPr>
+      </p:pic>
+      <p:pic>
+        <p:nvPicPr>
+          <p:cNvPr id="13" name="Imagem 12" descr="Ícone&#10;&#10;O conteúdo gerado por IA pode estar incorreto.">
+            <a:extLst>
+              <a:ext uri="{FF2B5EF4-FFF2-40B4-BE49-F238E27FC236}">
+                <a16:creationId xmlns:a16="http://schemas.microsoft.com/office/drawing/2014/main" id="{7A023A8A-AE9A-9ADB-9B3E-1DB876F58701}"/>
+              </a:ext>
+            </a:extLst>
+          </p:cNvPr>
+          <p:cNvPicPr>
+            <a:picLocks noChangeAspect="1"/>
+          </p:cNvPicPr>
+          <p:nvPr/>
+        </p:nvPicPr>
+        <p:blipFill>
+          <a:blip r:embed="rId10">
+            <a:extLst>
+              <a:ext uri="{28A0092B-C50C-407E-A947-70E740481C1C}">
+                <a14:useLocalDpi xmlns:a14="http://schemas.microsoft.com/office/drawing/2010/main" val="0"/>
+              </a:ext>
+            </a:extLst>
+          </a:blip>
+          <a:stretch>
+            <a:fillRect/>
+          </a:stretch>
+        </p:blipFill>
+        <p:spPr>
+          <a:xfrm>
+            <a:off x="88190" y="4303881"/>
+            <a:ext cx="351582" cy="351582"/>
+          </a:xfrm>
+          <a:prstGeom prst="rect">
+            <a:avLst/>
+          </a:prstGeom>
+        </p:spPr>
+      </p:pic>
+      <p:pic>
+        <p:nvPicPr>
+          <p:cNvPr id="14" name="Imagem 13" descr="Uma imagem contendo Ícone&#10;&#10;O conteúdo gerado por IA pode estar incorreto.">
+            <a:extLst>
+              <a:ext uri="{FF2B5EF4-FFF2-40B4-BE49-F238E27FC236}">
+                <a16:creationId xmlns:a16="http://schemas.microsoft.com/office/drawing/2014/main" id="{40D1A4E2-482B-B875-1CD3-25239AC08C0C}"/>
+              </a:ext>
+            </a:extLst>
+          </p:cNvPr>
+          <p:cNvPicPr>
+            <a:picLocks noChangeAspect="1"/>
+          </p:cNvPicPr>
+          <p:nvPr/>
+        </p:nvPicPr>
+        <p:blipFill>
+          <a:blip r:embed="rId11">
+            <a:extLst>
+              <a:ext uri="{28A0092B-C50C-407E-A947-70E740481C1C}">
+                <a14:useLocalDpi xmlns:a14="http://schemas.microsoft.com/office/drawing/2010/main" val="0"/>
+              </a:ext>
+            </a:extLst>
+          </a:blip>
+          <a:stretch>
+            <a:fillRect/>
+          </a:stretch>
+        </p:blipFill>
+        <p:spPr>
+          <a:xfrm flipH="1">
+            <a:off x="106392" y="1383777"/>
+            <a:ext cx="316754" cy="316754"/>
+          </a:xfrm>
+          <a:prstGeom prst="rect">
+            <a:avLst/>
+          </a:prstGeom>
+        </p:spPr>
+      </p:pic>
     </p:spTree>
     <p:extLst>
       <p:ext uri="{BB962C8B-B14F-4D97-AF65-F5344CB8AC3E}">

</xml_diff>

<commit_message>
refact: matriz de risco do dashboard operacional melhorada com sistema de alertas
</commit_message>
<xml_diff>
--- a/dashboards/Mockup dashboard (em construção).pptx
+++ b/dashboards/Mockup dashboard (em construção).pptx
@@ -260,7 +260,7 @@
           <a:p>
             <a:fld id="{2DB56B22-234B-48A0-9B90-72A4AF419D03}" type="datetimeFigureOut">
               <a:rPr lang="pt-BR" smtClean="0"/>
-              <a:t>16/02/2026</a:t>
+              <a:t>17/02/2026</a:t>
             </a:fld>
             <a:endParaRPr lang="pt-BR"/>
           </a:p>
@@ -458,7 +458,7 @@
           <a:p>
             <a:fld id="{2DB56B22-234B-48A0-9B90-72A4AF419D03}" type="datetimeFigureOut">
               <a:rPr lang="pt-BR" smtClean="0"/>
-              <a:t>16/02/2026</a:t>
+              <a:t>17/02/2026</a:t>
             </a:fld>
             <a:endParaRPr lang="pt-BR"/>
           </a:p>
@@ -666,7 +666,7 @@
           <a:p>
             <a:fld id="{2DB56B22-234B-48A0-9B90-72A4AF419D03}" type="datetimeFigureOut">
               <a:rPr lang="pt-BR" smtClean="0"/>
-              <a:t>16/02/2026</a:t>
+              <a:t>17/02/2026</a:t>
             </a:fld>
             <a:endParaRPr lang="pt-BR"/>
           </a:p>
@@ -864,7 +864,7 @@
           <a:p>
             <a:fld id="{2DB56B22-234B-48A0-9B90-72A4AF419D03}" type="datetimeFigureOut">
               <a:rPr lang="pt-BR" smtClean="0"/>
-              <a:t>16/02/2026</a:t>
+              <a:t>17/02/2026</a:t>
             </a:fld>
             <a:endParaRPr lang="pt-BR"/>
           </a:p>
@@ -1139,7 +1139,7 @@
           <a:p>
             <a:fld id="{2DB56B22-234B-48A0-9B90-72A4AF419D03}" type="datetimeFigureOut">
               <a:rPr lang="pt-BR" smtClean="0"/>
-              <a:t>16/02/2026</a:t>
+              <a:t>17/02/2026</a:t>
             </a:fld>
             <a:endParaRPr lang="pt-BR"/>
           </a:p>
@@ -1404,7 +1404,7 @@
           <a:p>
             <a:fld id="{2DB56B22-234B-48A0-9B90-72A4AF419D03}" type="datetimeFigureOut">
               <a:rPr lang="pt-BR" smtClean="0"/>
-              <a:t>16/02/2026</a:t>
+              <a:t>17/02/2026</a:t>
             </a:fld>
             <a:endParaRPr lang="pt-BR"/>
           </a:p>
@@ -1816,7 +1816,7 @@
           <a:p>
             <a:fld id="{2DB56B22-234B-48A0-9B90-72A4AF419D03}" type="datetimeFigureOut">
               <a:rPr lang="pt-BR" smtClean="0"/>
-              <a:t>16/02/2026</a:t>
+              <a:t>17/02/2026</a:t>
             </a:fld>
             <a:endParaRPr lang="pt-BR"/>
           </a:p>
@@ -1957,7 +1957,7 @@
           <a:p>
             <a:fld id="{2DB56B22-234B-48A0-9B90-72A4AF419D03}" type="datetimeFigureOut">
               <a:rPr lang="pt-BR" smtClean="0"/>
-              <a:t>16/02/2026</a:t>
+              <a:t>17/02/2026</a:t>
             </a:fld>
             <a:endParaRPr lang="pt-BR"/>
           </a:p>
@@ -2070,7 +2070,7 @@
           <a:p>
             <a:fld id="{2DB56B22-234B-48A0-9B90-72A4AF419D03}" type="datetimeFigureOut">
               <a:rPr lang="pt-BR" smtClean="0"/>
-              <a:t>16/02/2026</a:t>
+              <a:t>17/02/2026</a:t>
             </a:fld>
             <a:endParaRPr lang="pt-BR"/>
           </a:p>
@@ -2381,7 +2381,7 @@
           <a:p>
             <a:fld id="{2DB56B22-234B-48A0-9B90-72A4AF419D03}" type="datetimeFigureOut">
               <a:rPr lang="pt-BR" smtClean="0"/>
-              <a:t>16/02/2026</a:t>
+              <a:t>17/02/2026</a:t>
             </a:fld>
             <a:endParaRPr lang="pt-BR"/>
           </a:p>
@@ -2669,7 +2669,7 @@
           <a:p>
             <a:fld id="{2DB56B22-234B-48A0-9B90-72A4AF419D03}" type="datetimeFigureOut">
               <a:rPr lang="pt-BR" smtClean="0"/>
-              <a:t>16/02/2026</a:t>
+              <a:t>17/02/2026</a:t>
             </a:fld>
             <a:endParaRPr lang="pt-BR"/>
           </a:p>
@@ -2910,7 +2910,7 @@
           <a:p>
             <a:fld id="{2DB56B22-234B-48A0-9B90-72A4AF419D03}" type="datetimeFigureOut">
               <a:rPr lang="pt-BR" smtClean="0"/>
-              <a:t>16/02/2026</a:t>
+              <a:t>17/02/2026</a:t>
             </a:fld>
             <a:endParaRPr lang="pt-BR"/>
           </a:p>
@@ -4234,68 +4234,7 @@
         <p:spPr>
           <a:xfrm>
             <a:off x="1049149" y="4820478"/>
-            <a:ext cx="5178277" cy="1921835"/>
-          </a:xfrm>
-          <a:prstGeom prst="roundRect">
-            <a:avLst>
-              <a:gd name="adj" fmla="val 4729"/>
-            </a:avLst>
-          </a:prstGeom>
-          <a:solidFill>
-            <a:schemeClr val="bg1"/>
-          </a:solidFill>
-          <a:ln>
-            <a:noFill/>
-          </a:ln>
-          <a:effectLst>
-            <a:outerShdw blurRad="101600" dist="38100" dir="5400000" algn="t" rotWithShape="0">
-              <a:prstClr val="black">
-                <a:alpha val="20000"/>
-              </a:prstClr>
-            </a:outerShdw>
-          </a:effectLst>
-        </p:spPr>
-        <p:style>
-          <a:lnRef idx="2">
-            <a:schemeClr val="accent1">
-              <a:shade val="15000"/>
-            </a:schemeClr>
-          </a:lnRef>
-          <a:fillRef idx="1">
-            <a:schemeClr val="accent1"/>
-          </a:fillRef>
-          <a:effectRef idx="0">
-            <a:schemeClr val="accent1"/>
-          </a:effectRef>
-          <a:fontRef idx="minor">
-            <a:schemeClr val="lt1"/>
-          </a:fontRef>
-        </p:style>
-        <p:txBody>
-          <a:bodyPr rtlCol="0" anchor="ctr"/>
-          <a:lstStyle/>
-          <a:p>
-            <a:pPr algn="ctr"/>
-            <a:endParaRPr lang="pt-BR"/>
-          </a:p>
-        </p:txBody>
-      </p:sp>
-      <p:sp>
-        <p:nvSpPr>
-          <p:cNvPr id="14" name="Retângulo: Cantos Arredondados 13">
-            <a:extLst>
-              <a:ext uri="{FF2B5EF4-FFF2-40B4-BE49-F238E27FC236}">
-                <a16:creationId xmlns:a16="http://schemas.microsoft.com/office/drawing/2014/main" id="{3BD63590-4230-B4DA-8D3B-5B261E5228D4}"/>
-              </a:ext>
-            </a:extLst>
-          </p:cNvPr>
-          <p:cNvSpPr/>
-          <p:nvPr/>
-        </p:nvSpPr>
-        <p:spPr>
-          <a:xfrm>
-            <a:off x="6557396" y="4820478"/>
-            <a:ext cx="5203969" cy="1921835"/>
+            <a:ext cx="10737908" cy="1921835"/>
           </a:xfrm>
           <a:prstGeom prst="roundRect">
             <a:avLst>
@@ -4531,8 +4470,8 @@
         </p:blipFill>
         <p:spPr>
           <a:xfrm>
-            <a:off x="2966410" y="949186"/>
-            <a:ext cx="356262" cy="356262"/>
+            <a:off x="3062031" y="947512"/>
+            <a:ext cx="309734" cy="309734"/>
           </a:xfrm>
           <a:prstGeom prst="rect">
             <a:avLst/>
@@ -4553,8 +4492,8 @@
         </p:nvSpPr>
         <p:spPr>
           <a:xfrm>
-            <a:off x="2927746" y="905117"/>
-            <a:ext cx="433589" cy="466012"/>
+            <a:off x="3025008" y="897622"/>
+            <a:ext cx="383779" cy="406040"/>
           </a:xfrm>
           <a:prstGeom prst="roundRect">
             <a:avLst>
@@ -4609,8 +4548,8 @@
         </p:nvSpPr>
         <p:spPr>
           <a:xfrm>
-            <a:off x="5695412" y="909113"/>
-            <a:ext cx="450374" cy="466489"/>
+            <a:off x="5769033" y="909113"/>
+            <a:ext cx="418317" cy="402043"/>
           </a:xfrm>
           <a:prstGeom prst="roundRect">
             <a:avLst>
@@ -4665,8 +4604,8 @@
         </p:nvSpPr>
         <p:spPr>
           <a:xfrm>
-            <a:off x="8460555" y="917288"/>
-            <a:ext cx="450374" cy="466489"/>
+            <a:off x="8615655" y="917288"/>
+            <a:ext cx="337606" cy="393868"/>
           </a:xfrm>
           <a:prstGeom prst="roundRect">
             <a:avLst>
@@ -4721,8 +4660,8 @@
         </p:nvSpPr>
         <p:spPr>
           <a:xfrm>
-            <a:off x="11250650" y="917289"/>
-            <a:ext cx="447922" cy="458314"/>
+            <a:off x="11375942" y="917289"/>
+            <a:ext cx="351700" cy="393867"/>
           </a:xfrm>
           <a:prstGeom prst="roundRect">
             <a:avLst>
@@ -4791,8 +4730,8 @@
         </p:blipFill>
         <p:spPr>
           <a:xfrm>
-            <a:off x="5742122" y="947711"/>
-            <a:ext cx="356953" cy="356953"/>
+            <a:off x="5814479" y="947711"/>
+            <a:ext cx="309535" cy="309535"/>
           </a:xfrm>
           <a:prstGeom prst="rect">
             <a:avLst/>
@@ -4801,10 +4740,10 @@
       </p:pic>
       <p:pic>
         <p:nvPicPr>
-          <p:cNvPr id="69" name="Imagem 68" descr="Ícone&#10;&#10;O conteúdo gerado por IA pode estar incorreto.">
-            <a:extLst>
-              <a:ext uri="{FF2B5EF4-FFF2-40B4-BE49-F238E27FC236}">
-                <a16:creationId xmlns:a16="http://schemas.microsoft.com/office/drawing/2014/main" id="{7AAF50FD-FA58-C69A-C8F7-9BE46597795F}"/>
+          <p:cNvPr id="71" name="Imagem 70" descr="Ícone&#10;&#10;O conteúdo gerado por IA pode estar incorreto.">
+            <a:extLst>
+              <a:ext uri="{FF2B5EF4-FFF2-40B4-BE49-F238E27FC236}">
+                <a16:creationId xmlns:a16="http://schemas.microsoft.com/office/drawing/2014/main" id="{E0B9E829-DC81-1BF0-7000-2ACC9FCACE2F}"/>
               </a:ext>
             </a:extLst>
           </p:cNvPr>
@@ -4827,8 +4766,8 @@
         </p:blipFill>
         <p:spPr>
           <a:xfrm>
-            <a:off x="11294076" y="951886"/>
-            <a:ext cx="359270" cy="359270"/>
+            <a:off x="8644435" y="975405"/>
+            <a:ext cx="280046" cy="280046"/>
           </a:xfrm>
           <a:prstGeom prst="rect">
             <a:avLst/>
@@ -4837,10 +4776,10 @@
       </p:pic>
       <p:pic>
         <p:nvPicPr>
-          <p:cNvPr id="71" name="Imagem 70" descr="Ícone&#10;&#10;O conteúdo gerado por IA pode estar incorreto.">
-            <a:extLst>
-              <a:ext uri="{FF2B5EF4-FFF2-40B4-BE49-F238E27FC236}">
-                <a16:creationId xmlns:a16="http://schemas.microsoft.com/office/drawing/2014/main" id="{E0B9E829-DC81-1BF0-7000-2ACC9FCACE2F}"/>
+          <p:cNvPr id="13" name="Imagem 12" descr="Ícone&#10;&#10;O conteúdo gerado por IA pode estar incorreto.">
+            <a:extLst>
+              <a:ext uri="{FF2B5EF4-FFF2-40B4-BE49-F238E27FC236}">
+                <a16:creationId xmlns:a16="http://schemas.microsoft.com/office/drawing/2014/main" id="{A1ACA8E9-C0F4-E4F7-6378-47AAA5A7640F}"/>
               </a:ext>
             </a:extLst>
           </p:cNvPr>
@@ -4863,8 +4802,8 @@
         </p:blipFill>
         <p:spPr>
           <a:xfrm>
-            <a:off x="8525368" y="977200"/>
-            <a:ext cx="328001" cy="328001"/>
+            <a:off x="88190" y="2818496"/>
+            <a:ext cx="351582" cy="351582"/>
           </a:xfrm>
           <a:prstGeom prst="rect">
             <a:avLst/>
@@ -4873,10 +4812,10 @@
       </p:pic>
       <p:pic>
         <p:nvPicPr>
-          <p:cNvPr id="13" name="Imagem 12" descr="Ícone&#10;&#10;O conteúdo gerado por IA pode estar incorreto.">
-            <a:extLst>
-              <a:ext uri="{FF2B5EF4-FFF2-40B4-BE49-F238E27FC236}">
-                <a16:creationId xmlns:a16="http://schemas.microsoft.com/office/drawing/2014/main" id="{A1ACA8E9-C0F4-E4F7-6378-47AAA5A7640F}"/>
+          <p:cNvPr id="16" name="Imagem 15" descr="Logotipo, Ícone&#10;&#10;O conteúdo gerado por IA pode estar incorreto.">
+            <a:extLst>
+              <a:ext uri="{FF2B5EF4-FFF2-40B4-BE49-F238E27FC236}">
+                <a16:creationId xmlns:a16="http://schemas.microsoft.com/office/drawing/2014/main" id="{72750EFD-5EB9-84F7-327A-F804A22CDF68}"/>
               </a:ext>
             </a:extLst>
           </p:cNvPr>
@@ -4899,7 +4838,7 @@
         </p:blipFill>
         <p:spPr>
           <a:xfrm>
-            <a:off x="88190" y="2818496"/>
+            <a:off x="88190" y="3647572"/>
             <a:ext cx="351582" cy="351582"/>
           </a:xfrm>
           <a:prstGeom prst="rect">
@@ -4909,10 +4848,10 @@
       </p:pic>
       <p:pic>
         <p:nvPicPr>
-          <p:cNvPr id="16" name="Imagem 15" descr="Logotipo, Ícone&#10;&#10;O conteúdo gerado por IA pode estar incorreto.">
-            <a:extLst>
-              <a:ext uri="{FF2B5EF4-FFF2-40B4-BE49-F238E27FC236}">
-                <a16:creationId xmlns:a16="http://schemas.microsoft.com/office/drawing/2014/main" id="{72750EFD-5EB9-84F7-327A-F804A22CDF68}"/>
+          <p:cNvPr id="20" name="Imagem 19" descr="Ícone&#10;&#10;O conteúdo gerado por IA pode estar incorreto.">
+            <a:extLst>
+              <a:ext uri="{FF2B5EF4-FFF2-40B4-BE49-F238E27FC236}">
+                <a16:creationId xmlns:a16="http://schemas.microsoft.com/office/drawing/2014/main" id="{95F4F035-D941-A804-F42E-3472DA42A5B0}"/>
               </a:ext>
             </a:extLst>
           </p:cNvPr>
@@ -4935,8 +4874,8 @@
         </p:blipFill>
         <p:spPr>
           <a:xfrm>
-            <a:off x="88190" y="3647572"/>
-            <a:ext cx="351582" cy="351582"/>
+            <a:off x="108808" y="2135685"/>
+            <a:ext cx="296136" cy="296136"/>
           </a:xfrm>
           <a:prstGeom prst="rect">
             <a:avLst/>
@@ -4945,10 +4884,10 @@
       </p:pic>
       <p:pic>
         <p:nvPicPr>
-          <p:cNvPr id="20" name="Imagem 19" descr="Ícone&#10;&#10;O conteúdo gerado por IA pode estar incorreto.">
-            <a:extLst>
-              <a:ext uri="{FF2B5EF4-FFF2-40B4-BE49-F238E27FC236}">
-                <a16:creationId xmlns:a16="http://schemas.microsoft.com/office/drawing/2014/main" id="{95F4F035-D941-A804-F42E-3472DA42A5B0}"/>
+          <p:cNvPr id="22" name="Imagem 21" descr="Ícone&#10;&#10;O conteúdo gerado por IA pode estar incorreto.">
+            <a:extLst>
+              <a:ext uri="{FF2B5EF4-FFF2-40B4-BE49-F238E27FC236}">
+                <a16:creationId xmlns:a16="http://schemas.microsoft.com/office/drawing/2014/main" id="{80050991-3381-8A02-8110-9D095FC4F3C1}"/>
               </a:ext>
             </a:extLst>
           </p:cNvPr>
@@ -4971,8 +4910,8 @@
         </p:blipFill>
         <p:spPr>
           <a:xfrm>
-            <a:off x="108808" y="2135685"/>
-            <a:ext cx="296136" cy="296136"/>
+            <a:off x="88190" y="4303881"/>
+            <a:ext cx="351582" cy="351582"/>
           </a:xfrm>
           <a:prstGeom prst="rect">
             <a:avLst/>
@@ -4981,10 +4920,10 @@
       </p:pic>
       <p:pic>
         <p:nvPicPr>
-          <p:cNvPr id="22" name="Imagem 21" descr="Ícone&#10;&#10;O conteúdo gerado por IA pode estar incorreto.">
-            <a:extLst>
-              <a:ext uri="{FF2B5EF4-FFF2-40B4-BE49-F238E27FC236}">
-                <a16:creationId xmlns:a16="http://schemas.microsoft.com/office/drawing/2014/main" id="{80050991-3381-8A02-8110-9D095FC4F3C1}"/>
+          <p:cNvPr id="25" name="Imagem 24" descr="Uma imagem contendo Ícone&#10;&#10;O conteúdo gerado por IA pode estar incorreto.">
+            <a:extLst>
+              <a:ext uri="{FF2B5EF4-FFF2-40B4-BE49-F238E27FC236}">
+                <a16:creationId xmlns:a16="http://schemas.microsoft.com/office/drawing/2014/main" id="{09D0A347-19B1-96AE-D96A-6F3E5EBE9360}"/>
               </a:ext>
             </a:extLst>
           </p:cNvPr>
@@ -5006,9 +4945,9 @@
           </a:stretch>
         </p:blipFill>
         <p:spPr>
-          <a:xfrm>
-            <a:off x="88190" y="4303881"/>
-            <a:ext cx="351582" cy="351582"/>
+          <a:xfrm flipH="1">
+            <a:off x="106392" y="1383777"/>
+            <a:ext cx="316754" cy="316754"/>
           </a:xfrm>
           <a:prstGeom prst="rect">
             <a:avLst/>
@@ -5017,10 +4956,10 @@
       </p:pic>
       <p:pic>
         <p:nvPicPr>
-          <p:cNvPr id="25" name="Imagem 24" descr="Uma imagem contendo Ícone&#10;&#10;O conteúdo gerado por IA pode estar incorreto.">
-            <a:extLst>
-              <a:ext uri="{FF2B5EF4-FFF2-40B4-BE49-F238E27FC236}">
-                <a16:creationId xmlns:a16="http://schemas.microsoft.com/office/drawing/2014/main" id="{09D0A347-19B1-96AE-D96A-6F3E5EBE9360}"/>
+          <p:cNvPr id="3" name="Imagem 2" descr="Ícone&#10;&#10;O conteúdo gerado por IA pode estar incorreto.">
+            <a:extLst>
+              <a:ext uri="{FF2B5EF4-FFF2-40B4-BE49-F238E27FC236}">
+                <a16:creationId xmlns:a16="http://schemas.microsoft.com/office/drawing/2014/main" id="{60520814-EC16-C5F5-700B-70441E084DDC}"/>
               </a:ext>
             </a:extLst>
           </p:cNvPr>
@@ -5042,9 +4981,9 @@
           </a:stretch>
         </p:blipFill>
         <p:spPr>
-          <a:xfrm flipH="1">
-            <a:off x="106392" y="1383777"/>
-            <a:ext cx="316754" cy="316754"/>
+          <a:xfrm>
+            <a:off x="11414986" y="965077"/>
+            <a:ext cx="273612" cy="301224"/>
           </a:xfrm>
           <a:prstGeom prst="rect">
             <a:avLst/>

</xml_diff>